<commit_message>
02 construindo layout parte 1 fim
</commit_message>
<xml_diff>
--- a/007-criando_relatorios_e_dashboards-parte2/menu_dashboard.pptx
+++ b/007-criando_relatorios_e_dashboards-parte2/menu_dashboard.pptx
@@ -104,6 +104,11 @@
       </a:defRPr>
     </a:lvl9pPr>
   </p:defaultTextStyle>
+  <p:extLst>
+    <p:ext uri="{EFAFB233-063F-42B5-8137-9DF3F51BA10A}">
+      <p15:sldGuideLst xmlns:p15="http://schemas.microsoft.com/office/powerpoint/2012/main"/>
+    </p:ext>
+  </p:extLst>
 </p:presentation>
 </file>
 
@@ -3442,7 +3447,7 @@
         </p:nvSpPr>
         <p:spPr>
           <a:xfrm>
-            <a:off x="0" y="0"/>
+            <a:off x="0" y="1"/>
             <a:ext cx="12192000" cy="6857999"/>
           </a:xfrm>
           <a:prstGeom prst="rect">
@@ -3474,8 +3479,13 @@
           <a:bodyPr rtlCol="0" anchor="ctr"/>
           <a:lstStyle/>
           <a:p>
-            <a:pPr algn="ctr"/>
-            <a:endParaRPr lang="pt-BR"/>
+            <a:endParaRPr lang="pt-BR" b="1" dirty="0">
+              <a:solidFill>
+                <a:schemeClr val="bg1"/>
+              </a:solidFill>
+              <a:latin typeface="Segoe UI" panose="020B0502040204020203" pitchFamily="34" charset="0"/>
+              <a:cs typeface="Segoe UI" panose="020B0502040204020203" pitchFamily="34" charset="0"/>
+            </a:endParaRPr>
           </a:p>
         </p:txBody>
       </p:sp>
@@ -3523,6 +3533,214 @@
                 <a:cs typeface="Segoe UI" panose="020B0502040204020203" pitchFamily="34" charset="0"/>
               </a:rPr>
               <a:t>Data Analysis Dashboard</a:t>
+            </a:r>
+          </a:p>
+        </p:txBody>
+      </p:sp>
+      <p:sp>
+        <p:nvSpPr>
+          <p:cNvPr id="4" name="TextBox 3">
+            <a:extLst>
+              <a:ext uri="{FF2B5EF4-FFF2-40B4-BE49-F238E27FC236}">
+                <a16:creationId xmlns:a16="http://schemas.microsoft.com/office/drawing/2014/main" id="{436F9927-DB9D-F1FF-A189-C1E50CE01116}"/>
+              </a:ext>
+            </a:extLst>
+          </p:cNvPr>
+          <p:cNvSpPr txBox="1"/>
+          <p:nvPr/>
+        </p:nvSpPr>
+        <p:spPr>
+          <a:xfrm>
+            <a:off x="10021824" y="6037564"/>
+            <a:ext cx="1840144" cy="400110"/>
+          </a:xfrm>
+          <a:prstGeom prst="rect">
+            <a:avLst/>
+          </a:prstGeom>
+          <a:noFill/>
+        </p:spPr>
+        <p:txBody>
+          <a:bodyPr wrap="square" rtlCol="0">
+            <a:spAutoFit/>
+          </a:bodyPr>
+          <a:lstStyle/>
+          <a:p>
+            <a:r>
+              <a:rPr lang="pt-BR" sz="2000" b="1" dirty="0">
+                <a:solidFill>
+                  <a:schemeClr val="accent2">
+                    <a:lumMod val="60000"/>
+                    <a:lumOff val="40000"/>
+                  </a:schemeClr>
+                </a:solidFill>
+                <a:latin typeface="MV Boli" panose="02000500030200090000" pitchFamily="2" charset="0"/>
+                <a:cs typeface="MV Boli" panose="02000500030200090000" pitchFamily="2" charset="0"/>
+              </a:rPr>
+              <a:t>#</a:t>
+            </a:r>
+            <a:r>
+              <a:rPr lang="pt-BR" sz="2000" b="1" dirty="0">
+                <a:solidFill>
+                  <a:schemeClr val="bg1"/>
+                </a:solidFill>
+                <a:latin typeface="MV Boli" panose="02000500030200090000" pitchFamily="2" charset="0"/>
+                <a:cs typeface="MV Boli" panose="02000500030200090000" pitchFamily="2" charset="0"/>
+              </a:rPr>
+              <a:t>harbes.corp</a:t>
+            </a:r>
+          </a:p>
+        </p:txBody>
+      </p:sp>
+      <p:pic>
+        <p:nvPicPr>
+          <p:cNvPr id="9" name="Picture 8">
+            <a:extLst>
+              <a:ext uri="{FF2B5EF4-FFF2-40B4-BE49-F238E27FC236}">
+                <a16:creationId xmlns:a16="http://schemas.microsoft.com/office/drawing/2014/main" id="{2D798732-2A0E-F202-5D58-DEF883D6FA40}"/>
+              </a:ext>
+            </a:extLst>
+          </p:cNvPr>
+          <p:cNvPicPr>
+            <a:picLocks noChangeAspect="1"/>
+          </p:cNvPicPr>
+          <p:nvPr/>
+        </p:nvPicPr>
+        <p:blipFill>
+          <a:blip r:embed="rId3">
+            <a:extLst>
+              <a:ext uri="{28A0092B-C50C-407E-A947-70E740481C1C}">
+                <a14:useLocalDpi xmlns:a14="http://schemas.microsoft.com/office/drawing/2010/main" val="0"/>
+              </a:ext>
+            </a:extLst>
+          </a:blip>
+          <a:stretch>
+            <a:fillRect/>
+          </a:stretch>
+        </p:blipFill>
+        <p:spPr>
+          <a:xfrm>
+            <a:off x="9870777" y="3300594"/>
+            <a:ext cx="635679" cy="692673"/>
+          </a:xfrm>
+          <a:prstGeom prst="rect">
+            <a:avLst/>
+          </a:prstGeom>
+        </p:spPr>
+      </p:pic>
+      <p:pic>
+        <p:nvPicPr>
+          <p:cNvPr id="11" name="Picture 10">
+            <a:extLst>
+              <a:ext uri="{FF2B5EF4-FFF2-40B4-BE49-F238E27FC236}">
+                <a16:creationId xmlns:a16="http://schemas.microsoft.com/office/drawing/2014/main" id="{E4BD12EE-347D-6EA3-DDA4-128CB48B1CD6}"/>
+              </a:ext>
+            </a:extLst>
+          </p:cNvPr>
+          <p:cNvPicPr>
+            <a:picLocks noChangeAspect="1"/>
+          </p:cNvPicPr>
+          <p:nvPr/>
+        </p:nvPicPr>
+        <p:blipFill>
+          <a:blip r:embed="rId4">
+            <a:extLst>
+              <a:ext uri="{28A0092B-C50C-407E-A947-70E740481C1C}">
+                <a14:useLocalDpi xmlns:a14="http://schemas.microsoft.com/office/drawing/2010/main" val="0"/>
+              </a:ext>
+            </a:extLst>
+          </a:blip>
+          <a:stretch>
+            <a:fillRect/>
+          </a:stretch>
+        </p:blipFill>
+        <p:spPr>
+          <a:xfrm>
+            <a:off x="9870777" y="4501909"/>
+            <a:ext cx="635680" cy="692674"/>
+          </a:xfrm>
+          <a:prstGeom prst="rect">
+            <a:avLst/>
+          </a:prstGeom>
+        </p:spPr>
+      </p:pic>
+      <p:sp>
+        <p:nvSpPr>
+          <p:cNvPr id="12" name="TextBox 11">
+            <a:extLst>
+              <a:ext uri="{FF2B5EF4-FFF2-40B4-BE49-F238E27FC236}">
+                <a16:creationId xmlns:a16="http://schemas.microsoft.com/office/drawing/2014/main" id="{F274CC54-14ED-D4CF-DF78-4647416DC526}"/>
+              </a:ext>
+            </a:extLst>
+          </p:cNvPr>
+          <p:cNvSpPr txBox="1"/>
+          <p:nvPr/>
+        </p:nvSpPr>
+        <p:spPr>
+          <a:xfrm>
+            <a:off x="10506456" y="3483864"/>
+            <a:ext cx="1225296" cy="369332"/>
+          </a:xfrm>
+          <a:prstGeom prst="rect">
+            <a:avLst/>
+          </a:prstGeom>
+          <a:noFill/>
+        </p:spPr>
+        <p:txBody>
+          <a:bodyPr wrap="square" rtlCol="0">
+            <a:spAutoFit/>
+          </a:bodyPr>
+          <a:lstStyle/>
+          <a:p>
+            <a:r>
+              <a:rPr lang="pt-BR" b="1" dirty="0">
+                <a:solidFill>
+                  <a:schemeClr val="bg1"/>
+                </a:solidFill>
+                <a:latin typeface="Segoe UI" panose="020B0502040204020203" pitchFamily="34" charset="0"/>
+                <a:cs typeface="Segoe UI" panose="020B0502040204020203" pitchFamily="34" charset="0"/>
+              </a:rPr>
+              <a:t>Relatório</a:t>
+            </a:r>
+          </a:p>
+        </p:txBody>
+      </p:sp>
+      <p:sp>
+        <p:nvSpPr>
+          <p:cNvPr id="13" name="TextBox 12">
+            <a:extLst>
+              <a:ext uri="{FF2B5EF4-FFF2-40B4-BE49-F238E27FC236}">
+                <a16:creationId xmlns:a16="http://schemas.microsoft.com/office/drawing/2014/main" id="{3000D1FB-3443-4D92-0A78-47C97F8F396B}"/>
+              </a:ext>
+            </a:extLst>
+          </p:cNvPr>
+          <p:cNvSpPr txBox="1"/>
+          <p:nvPr/>
+        </p:nvSpPr>
+        <p:spPr>
+          <a:xfrm>
+            <a:off x="10506456" y="4642104"/>
+            <a:ext cx="1444752" cy="369332"/>
+          </a:xfrm>
+          <a:prstGeom prst="rect">
+            <a:avLst/>
+          </a:prstGeom>
+          <a:noFill/>
+        </p:spPr>
+        <p:txBody>
+          <a:bodyPr wrap="square" rtlCol="0">
+            <a:spAutoFit/>
+          </a:bodyPr>
+          <a:lstStyle/>
+          <a:p>
+            <a:r>
+              <a:rPr lang="pt-BR" b="1" dirty="0">
+                <a:solidFill>
+                  <a:schemeClr val="bg1"/>
+                </a:solidFill>
+                <a:latin typeface="Segoe UI" panose="020B0502040204020203" pitchFamily="34" charset="0"/>
+                <a:cs typeface="Segoe UI" panose="020B0502040204020203" pitchFamily="34" charset="0"/>
+              </a:rPr>
+              <a:t>Indicadores</a:t>
             </a:r>
           </a:p>
         </p:txBody>

</xml_diff>

<commit_message>
criaçao do slide 'relatorios'
</commit_message>
<xml_diff>
--- a/007-criando_relatorios_e_dashboards-parte2/menu_dashboard.pptx
+++ b/007-criando_relatorios_e_dashboards-parte2/menu_dashboard.pptx
@@ -6,6 +6,7 @@
   </p:sldMasterIdLst>
   <p:sldIdLst>
     <p:sldId id="256" r:id="rId2"/>
+    <p:sldId id="257" r:id="rId3"/>
   </p:sldIdLst>
   <p:sldSz cx="12192000" cy="6858000"/>
   <p:notesSz cx="6858000" cy="9144000"/>
@@ -261,7 +262,7 @@
           <a:p>
             <a:fld id="{ABE38136-2B41-4F4A-9088-83265D9E6BC0}" type="datetimeFigureOut">
               <a:rPr lang="pt-BR" smtClean="0"/>
-              <a:t>30/10/2023</a:t>
+              <a:t>31/10/2023</a:t>
             </a:fld>
             <a:endParaRPr lang="pt-BR"/>
           </a:p>
@@ -461,7 +462,7 @@
           <a:p>
             <a:fld id="{ABE38136-2B41-4F4A-9088-83265D9E6BC0}" type="datetimeFigureOut">
               <a:rPr lang="pt-BR" smtClean="0"/>
-              <a:t>30/10/2023</a:t>
+              <a:t>31/10/2023</a:t>
             </a:fld>
             <a:endParaRPr lang="pt-BR"/>
           </a:p>
@@ -671,7 +672,7 @@
           <a:p>
             <a:fld id="{ABE38136-2B41-4F4A-9088-83265D9E6BC0}" type="datetimeFigureOut">
               <a:rPr lang="pt-BR" smtClean="0"/>
-              <a:t>30/10/2023</a:t>
+              <a:t>31/10/2023</a:t>
             </a:fld>
             <a:endParaRPr lang="pt-BR"/>
           </a:p>
@@ -871,7 +872,7 @@
           <a:p>
             <a:fld id="{ABE38136-2B41-4F4A-9088-83265D9E6BC0}" type="datetimeFigureOut">
               <a:rPr lang="pt-BR" smtClean="0"/>
-              <a:t>30/10/2023</a:t>
+              <a:t>31/10/2023</a:t>
             </a:fld>
             <a:endParaRPr lang="pt-BR"/>
           </a:p>
@@ -1147,7 +1148,7 @@
           <a:p>
             <a:fld id="{ABE38136-2B41-4F4A-9088-83265D9E6BC0}" type="datetimeFigureOut">
               <a:rPr lang="pt-BR" smtClean="0"/>
-              <a:t>30/10/2023</a:t>
+              <a:t>31/10/2023</a:t>
             </a:fld>
             <a:endParaRPr lang="pt-BR"/>
           </a:p>
@@ -1415,7 +1416,7 @@
           <a:p>
             <a:fld id="{ABE38136-2B41-4F4A-9088-83265D9E6BC0}" type="datetimeFigureOut">
               <a:rPr lang="pt-BR" smtClean="0"/>
-              <a:t>30/10/2023</a:t>
+              <a:t>31/10/2023</a:t>
             </a:fld>
             <a:endParaRPr lang="pt-BR"/>
           </a:p>
@@ -1830,7 +1831,7 @@
           <a:p>
             <a:fld id="{ABE38136-2B41-4F4A-9088-83265D9E6BC0}" type="datetimeFigureOut">
               <a:rPr lang="pt-BR" smtClean="0"/>
-              <a:t>30/10/2023</a:t>
+              <a:t>31/10/2023</a:t>
             </a:fld>
             <a:endParaRPr lang="pt-BR"/>
           </a:p>
@@ -1972,7 +1973,7 @@
           <a:p>
             <a:fld id="{ABE38136-2B41-4F4A-9088-83265D9E6BC0}" type="datetimeFigureOut">
               <a:rPr lang="pt-BR" smtClean="0"/>
-              <a:t>30/10/2023</a:t>
+              <a:t>31/10/2023</a:t>
             </a:fld>
             <a:endParaRPr lang="pt-BR"/>
           </a:p>
@@ -2085,7 +2086,7 @@
           <a:p>
             <a:fld id="{ABE38136-2B41-4F4A-9088-83265D9E6BC0}" type="datetimeFigureOut">
               <a:rPr lang="pt-BR" smtClean="0"/>
-              <a:t>30/10/2023</a:t>
+              <a:t>31/10/2023</a:t>
             </a:fld>
             <a:endParaRPr lang="pt-BR"/>
           </a:p>
@@ -2398,7 +2399,7 @@
           <a:p>
             <a:fld id="{ABE38136-2B41-4F4A-9088-83265D9E6BC0}" type="datetimeFigureOut">
               <a:rPr lang="pt-BR" smtClean="0"/>
-              <a:t>30/10/2023</a:t>
+              <a:t>31/10/2023</a:t>
             </a:fld>
             <a:endParaRPr lang="pt-BR"/>
           </a:p>
@@ -2687,7 +2688,7 @@
           <a:p>
             <a:fld id="{ABE38136-2B41-4F4A-9088-83265D9E6BC0}" type="datetimeFigureOut">
               <a:rPr lang="pt-BR" smtClean="0"/>
-              <a:t>30/10/2023</a:t>
+              <a:t>31/10/2023</a:t>
             </a:fld>
             <a:endParaRPr lang="pt-BR"/>
           </a:p>
@@ -2930,7 +2931,7 @@
           <a:p>
             <a:fld id="{ABE38136-2B41-4F4A-9088-83265D9E6BC0}" type="datetimeFigureOut">
               <a:rPr lang="pt-BR" smtClean="0"/>
-              <a:t>30/10/2023</a:t>
+              <a:t>31/10/2023</a:t>
             </a:fld>
             <a:endParaRPr lang="pt-BR"/>
           </a:p>
@@ -3678,7 +3679,7 @@
         <p:spPr>
           <a:xfrm>
             <a:off x="10506456" y="3483864"/>
-            <a:ext cx="1225296" cy="369332"/>
+            <a:ext cx="1271016" cy="369332"/>
           </a:xfrm>
           <a:prstGeom prst="rect">
             <a:avLst/>
@@ -3699,7 +3700,7 @@
                 <a:latin typeface="Segoe UI" panose="020B0502040204020203" pitchFamily="34" charset="0"/>
                 <a:cs typeface="Segoe UI" panose="020B0502040204020203" pitchFamily="34" charset="0"/>
               </a:rPr>
-              <a:t>Relatório</a:t>
+              <a:t>Relatórios</a:t>
             </a:r>
           </a:p>
         </p:txBody>
@@ -3749,6 +3750,320 @@
     <p:extLst>
       <p:ext uri="{BB962C8B-B14F-4D97-AF65-F5344CB8AC3E}">
         <p14:creationId xmlns:p14="http://schemas.microsoft.com/office/powerpoint/2010/main" val="802347415"/>
+      </p:ext>
+    </p:extLst>
+  </p:cSld>
+  <p:clrMapOvr>
+    <a:masterClrMapping/>
+  </p:clrMapOvr>
+</p:sld>
+</file>
+
+<file path=ppt/slides/slide2.xml><?xml version="1.0" encoding="utf-8"?>
+<p:sld xmlns:a="http://schemas.openxmlformats.org/drawingml/2006/main" xmlns:r="http://schemas.openxmlformats.org/officeDocument/2006/relationships" xmlns:p="http://schemas.openxmlformats.org/presentationml/2006/main">
+  <p:cSld>
+    <p:spTree>
+      <p:nvGrpSpPr>
+        <p:cNvPr id="1" name=""/>
+        <p:cNvGrpSpPr/>
+        <p:nvPr/>
+      </p:nvGrpSpPr>
+      <p:grpSpPr>
+        <a:xfrm>
+          <a:off x="0" y="0"/>
+          <a:ext cx="0" cy="0"/>
+          <a:chOff x="0" y="0"/>
+          <a:chExt cx="0" cy="0"/>
+        </a:xfrm>
+      </p:grpSpPr>
+      <p:sp>
+        <p:nvSpPr>
+          <p:cNvPr id="5" name="Rectangle 4">
+            <a:extLst>
+              <a:ext uri="{FF2B5EF4-FFF2-40B4-BE49-F238E27FC236}">
+                <a16:creationId xmlns:a16="http://schemas.microsoft.com/office/drawing/2014/main" id="{690AA65F-ACDA-2705-D512-F97AAA3320EA}"/>
+              </a:ext>
+            </a:extLst>
+          </p:cNvPr>
+          <p:cNvSpPr/>
+          <p:nvPr/>
+        </p:nvSpPr>
+        <p:spPr>
+          <a:xfrm>
+            <a:off x="0" y="100584"/>
+            <a:ext cx="12192000" cy="742557"/>
+          </a:xfrm>
+          <a:prstGeom prst="rect">
+            <a:avLst/>
+          </a:prstGeom>
+          <a:solidFill>
+            <a:srgbClr val="34164A"/>
+          </a:solidFill>
+        </p:spPr>
+        <p:style>
+          <a:lnRef idx="2">
+            <a:schemeClr val="accent1">
+              <a:shade val="50000"/>
+            </a:schemeClr>
+          </a:lnRef>
+          <a:fillRef idx="1">
+            <a:schemeClr val="accent1"/>
+          </a:fillRef>
+          <a:effectRef idx="0">
+            <a:schemeClr val="accent1"/>
+          </a:effectRef>
+          <a:fontRef idx="minor">
+            <a:schemeClr val="lt1"/>
+          </a:fontRef>
+        </p:style>
+        <p:txBody>
+          <a:bodyPr rtlCol="0" anchor="ctr"/>
+          <a:lstStyle/>
+          <a:p>
+            <a:pPr algn="ctr"/>
+            <a:endParaRPr lang="pt-BR"/>
+          </a:p>
+        </p:txBody>
+      </p:sp>
+      <p:sp>
+        <p:nvSpPr>
+          <p:cNvPr id="6" name="Rectangle 5">
+            <a:extLst>
+              <a:ext uri="{FF2B5EF4-FFF2-40B4-BE49-F238E27FC236}">
+                <a16:creationId xmlns:a16="http://schemas.microsoft.com/office/drawing/2014/main" id="{E8C3E366-497E-2EE5-191E-BB5A5AA4F8A0}"/>
+              </a:ext>
+            </a:extLst>
+          </p:cNvPr>
+          <p:cNvSpPr/>
+          <p:nvPr/>
+        </p:nvSpPr>
+        <p:spPr>
+          <a:xfrm>
+            <a:off x="0" y="1314736"/>
+            <a:ext cx="12192000" cy="119920"/>
+          </a:xfrm>
+          <a:prstGeom prst="rect">
+            <a:avLst/>
+          </a:prstGeom>
+          <a:solidFill>
+            <a:srgbClr val="34164A"/>
+          </a:solidFill>
+        </p:spPr>
+        <p:style>
+          <a:lnRef idx="2">
+            <a:schemeClr val="accent1">
+              <a:shade val="50000"/>
+            </a:schemeClr>
+          </a:lnRef>
+          <a:fillRef idx="1">
+            <a:schemeClr val="accent1"/>
+          </a:fillRef>
+          <a:effectRef idx="0">
+            <a:schemeClr val="accent1"/>
+          </a:effectRef>
+          <a:fontRef idx="minor">
+            <a:schemeClr val="lt1"/>
+          </a:fontRef>
+        </p:style>
+        <p:txBody>
+          <a:bodyPr rtlCol="0" anchor="ctr"/>
+          <a:lstStyle/>
+          <a:p>
+            <a:pPr algn="ctr"/>
+            <a:endParaRPr lang="pt-BR"/>
+          </a:p>
+        </p:txBody>
+      </p:sp>
+      <p:sp>
+        <p:nvSpPr>
+          <p:cNvPr id="7" name="TextBox 6">
+            <a:extLst>
+              <a:ext uri="{FF2B5EF4-FFF2-40B4-BE49-F238E27FC236}">
+                <a16:creationId xmlns:a16="http://schemas.microsoft.com/office/drawing/2014/main" id="{1A629971-628F-EFBF-8C69-17217514ED56}"/>
+              </a:ext>
+            </a:extLst>
+          </p:cNvPr>
+          <p:cNvSpPr txBox="1"/>
+          <p:nvPr/>
+        </p:nvSpPr>
+        <p:spPr>
+          <a:xfrm>
+            <a:off x="108680" y="271806"/>
+            <a:ext cx="1840144" cy="400110"/>
+          </a:xfrm>
+          <a:prstGeom prst="rect">
+            <a:avLst/>
+          </a:prstGeom>
+          <a:noFill/>
+        </p:spPr>
+        <p:txBody>
+          <a:bodyPr wrap="square" rtlCol="0">
+            <a:spAutoFit/>
+          </a:bodyPr>
+          <a:lstStyle/>
+          <a:p>
+            <a:r>
+              <a:rPr lang="pt-BR" sz="2000" b="1" dirty="0">
+                <a:solidFill>
+                  <a:schemeClr val="accent2">
+                    <a:lumMod val="60000"/>
+                    <a:lumOff val="40000"/>
+                  </a:schemeClr>
+                </a:solidFill>
+                <a:latin typeface="MV Boli" panose="02000500030200090000" pitchFamily="2" charset="0"/>
+                <a:cs typeface="MV Boli" panose="02000500030200090000" pitchFamily="2" charset="0"/>
+              </a:rPr>
+              <a:t>#</a:t>
+            </a:r>
+            <a:r>
+              <a:rPr lang="pt-BR" sz="2000" b="1" dirty="0">
+                <a:solidFill>
+                  <a:schemeClr val="bg1"/>
+                </a:solidFill>
+                <a:latin typeface="MV Boli" panose="02000500030200090000" pitchFamily="2" charset="0"/>
+                <a:cs typeface="MV Boli" panose="02000500030200090000" pitchFamily="2" charset="0"/>
+              </a:rPr>
+              <a:t>harbes.corp</a:t>
+            </a:r>
+          </a:p>
+        </p:txBody>
+      </p:sp>
+      <p:sp>
+        <p:nvSpPr>
+          <p:cNvPr id="8" name="TextBox 7">
+            <a:extLst>
+              <a:ext uri="{FF2B5EF4-FFF2-40B4-BE49-F238E27FC236}">
+                <a16:creationId xmlns:a16="http://schemas.microsoft.com/office/drawing/2014/main" id="{B4A32A37-11AB-8302-2E90-9B52C892C5DE}"/>
+              </a:ext>
+            </a:extLst>
+          </p:cNvPr>
+          <p:cNvSpPr txBox="1"/>
+          <p:nvPr/>
+        </p:nvSpPr>
+        <p:spPr>
+          <a:xfrm>
+            <a:off x="3736848" y="179474"/>
+            <a:ext cx="4718304" cy="584775"/>
+          </a:xfrm>
+          <a:prstGeom prst="rect">
+            <a:avLst/>
+          </a:prstGeom>
+          <a:noFill/>
+        </p:spPr>
+        <p:txBody>
+          <a:bodyPr wrap="square" rtlCol="0">
+            <a:spAutoFit/>
+          </a:bodyPr>
+          <a:lstStyle/>
+          <a:p>
+            <a:pPr algn="ctr"/>
+            <a:r>
+              <a:rPr lang="pt-BR" sz="3200" b="1" dirty="0">
+                <a:solidFill>
+                  <a:schemeClr val="bg1"/>
+                </a:solidFill>
+                <a:latin typeface="Segoe UI" panose="020B0502040204020203" pitchFamily="34" charset="0"/>
+                <a:cs typeface="Segoe UI" panose="020B0502040204020203" pitchFamily="34" charset="0"/>
+              </a:rPr>
+              <a:t>Relatórios</a:t>
+            </a:r>
+          </a:p>
+        </p:txBody>
+      </p:sp>
+      <p:pic>
+        <p:nvPicPr>
+          <p:cNvPr id="10" name="Picture 9" descr="A house on a computer screen&#10;&#10;Description automatically generated">
+            <a:extLst>
+              <a:ext uri="{FF2B5EF4-FFF2-40B4-BE49-F238E27FC236}">
+                <a16:creationId xmlns:a16="http://schemas.microsoft.com/office/drawing/2014/main" id="{073B781E-E9E3-F0F9-21C2-EFCFB064868C}"/>
+              </a:ext>
+            </a:extLst>
+          </p:cNvPr>
+          <p:cNvPicPr>
+            <a:picLocks noChangeAspect="1"/>
+          </p:cNvPicPr>
+          <p:nvPr/>
+        </p:nvPicPr>
+        <p:blipFill>
+          <a:blip r:embed="rId2">
+            <a:extLst>
+              <a:ext uri="{28A0092B-C50C-407E-A947-70E740481C1C}">
+                <a14:useLocalDpi xmlns:a14="http://schemas.microsoft.com/office/drawing/2010/main" val="0"/>
+              </a:ext>
+            </a:extLst>
+          </a:blip>
+          <a:stretch>
+            <a:fillRect/>
+          </a:stretch>
+        </p:blipFill>
+        <p:spPr>
+          <a:xfrm>
+            <a:off x="11494008" y="214428"/>
+            <a:ext cx="525304" cy="525304"/>
+          </a:xfrm>
+          <a:prstGeom prst="rect">
+            <a:avLst/>
+          </a:prstGeom>
+        </p:spPr>
+      </p:pic>
+      <p:sp>
+        <p:nvSpPr>
+          <p:cNvPr id="11" name="Rectangle 10">
+            <a:extLst>
+              <a:ext uri="{FF2B5EF4-FFF2-40B4-BE49-F238E27FC236}">
+                <a16:creationId xmlns:a16="http://schemas.microsoft.com/office/drawing/2014/main" id="{CBCFFCCB-685B-E69B-98C6-05A43E8234DB}"/>
+              </a:ext>
+            </a:extLst>
+          </p:cNvPr>
+          <p:cNvSpPr/>
+          <p:nvPr/>
+        </p:nvSpPr>
+        <p:spPr>
+          <a:xfrm>
+            <a:off x="108680" y="1434656"/>
+            <a:ext cx="2543080" cy="5423344"/>
+          </a:xfrm>
+          <a:prstGeom prst="rect">
+            <a:avLst/>
+          </a:prstGeom>
+          <a:solidFill>
+            <a:schemeClr val="bg1">
+              <a:lumMod val="85000"/>
+            </a:schemeClr>
+          </a:solidFill>
+          <a:ln>
+            <a:noFill/>
+          </a:ln>
+        </p:spPr>
+        <p:style>
+          <a:lnRef idx="2">
+            <a:schemeClr val="accent1">
+              <a:shade val="50000"/>
+            </a:schemeClr>
+          </a:lnRef>
+          <a:fillRef idx="1">
+            <a:schemeClr val="accent1"/>
+          </a:fillRef>
+          <a:effectRef idx="0">
+            <a:schemeClr val="accent1"/>
+          </a:effectRef>
+          <a:fontRef idx="minor">
+            <a:schemeClr val="lt1"/>
+          </a:fontRef>
+        </p:style>
+        <p:txBody>
+          <a:bodyPr rtlCol="0" anchor="ctr"/>
+          <a:lstStyle/>
+          <a:p>
+            <a:pPr algn="ctr"/>
+            <a:endParaRPr lang="pt-BR"/>
+          </a:p>
+        </p:txBody>
+      </p:sp>
+    </p:spTree>
+    <p:extLst>
+      <p:ext uri="{BB962C8B-B14F-4D97-AF65-F5344CB8AC3E}">
+        <p14:creationId xmlns:p14="http://schemas.microsoft.com/office/powerpoint/2010/main" val="1314001823"/>
       </p:ext>
     </p:extLst>
   </p:cSld>

</xml_diff>

<commit_message>
alteracao do layout dashboard (titulo)
</commit_message>
<xml_diff>
--- a/007-criando_relatorios_e_dashboards-parte2/menu_dashboard.pptx
+++ b/007-criando_relatorios_e_dashboards-parte2/menu_dashboard.pptx
@@ -263,7 +263,7 @@
           <a:p>
             <a:fld id="{ABE38136-2B41-4F4A-9088-83265D9E6BC0}" type="datetimeFigureOut">
               <a:rPr lang="pt-BR" smtClean="0"/>
-              <a:t>31/10/2023</a:t>
+              <a:t>06/11/2023</a:t>
             </a:fld>
             <a:endParaRPr lang="pt-BR"/>
           </a:p>
@@ -463,7 +463,7 @@
           <a:p>
             <a:fld id="{ABE38136-2B41-4F4A-9088-83265D9E6BC0}" type="datetimeFigureOut">
               <a:rPr lang="pt-BR" smtClean="0"/>
-              <a:t>31/10/2023</a:t>
+              <a:t>06/11/2023</a:t>
             </a:fld>
             <a:endParaRPr lang="pt-BR"/>
           </a:p>
@@ -673,7 +673,7 @@
           <a:p>
             <a:fld id="{ABE38136-2B41-4F4A-9088-83265D9E6BC0}" type="datetimeFigureOut">
               <a:rPr lang="pt-BR" smtClean="0"/>
-              <a:t>31/10/2023</a:t>
+              <a:t>06/11/2023</a:t>
             </a:fld>
             <a:endParaRPr lang="pt-BR"/>
           </a:p>
@@ -873,7 +873,7 @@
           <a:p>
             <a:fld id="{ABE38136-2B41-4F4A-9088-83265D9E6BC0}" type="datetimeFigureOut">
               <a:rPr lang="pt-BR" smtClean="0"/>
-              <a:t>31/10/2023</a:t>
+              <a:t>06/11/2023</a:t>
             </a:fld>
             <a:endParaRPr lang="pt-BR"/>
           </a:p>
@@ -1149,7 +1149,7 @@
           <a:p>
             <a:fld id="{ABE38136-2B41-4F4A-9088-83265D9E6BC0}" type="datetimeFigureOut">
               <a:rPr lang="pt-BR" smtClean="0"/>
-              <a:t>31/10/2023</a:t>
+              <a:t>06/11/2023</a:t>
             </a:fld>
             <a:endParaRPr lang="pt-BR"/>
           </a:p>
@@ -1417,7 +1417,7 @@
           <a:p>
             <a:fld id="{ABE38136-2B41-4F4A-9088-83265D9E6BC0}" type="datetimeFigureOut">
               <a:rPr lang="pt-BR" smtClean="0"/>
-              <a:t>31/10/2023</a:t>
+              <a:t>06/11/2023</a:t>
             </a:fld>
             <a:endParaRPr lang="pt-BR"/>
           </a:p>
@@ -1832,7 +1832,7 @@
           <a:p>
             <a:fld id="{ABE38136-2B41-4F4A-9088-83265D9E6BC0}" type="datetimeFigureOut">
               <a:rPr lang="pt-BR" smtClean="0"/>
-              <a:t>31/10/2023</a:t>
+              <a:t>06/11/2023</a:t>
             </a:fld>
             <a:endParaRPr lang="pt-BR"/>
           </a:p>
@@ -1974,7 +1974,7 @@
           <a:p>
             <a:fld id="{ABE38136-2B41-4F4A-9088-83265D9E6BC0}" type="datetimeFigureOut">
               <a:rPr lang="pt-BR" smtClean="0"/>
-              <a:t>31/10/2023</a:t>
+              <a:t>06/11/2023</a:t>
             </a:fld>
             <a:endParaRPr lang="pt-BR"/>
           </a:p>
@@ -2087,7 +2087,7 @@
           <a:p>
             <a:fld id="{ABE38136-2B41-4F4A-9088-83265D9E6BC0}" type="datetimeFigureOut">
               <a:rPr lang="pt-BR" smtClean="0"/>
-              <a:t>31/10/2023</a:t>
+              <a:t>06/11/2023</a:t>
             </a:fld>
             <a:endParaRPr lang="pt-BR"/>
           </a:p>
@@ -2400,7 +2400,7 @@
           <a:p>
             <a:fld id="{ABE38136-2B41-4F4A-9088-83265D9E6BC0}" type="datetimeFigureOut">
               <a:rPr lang="pt-BR" smtClean="0"/>
-              <a:t>31/10/2023</a:t>
+              <a:t>06/11/2023</a:t>
             </a:fld>
             <a:endParaRPr lang="pt-BR"/>
           </a:p>
@@ -2689,7 +2689,7 @@
           <a:p>
             <a:fld id="{ABE38136-2B41-4F4A-9088-83265D9E6BC0}" type="datetimeFigureOut">
               <a:rPr lang="pt-BR" smtClean="0"/>
-              <a:t>31/10/2023</a:t>
+              <a:t>06/11/2023</a:t>
             </a:fld>
             <a:endParaRPr lang="pt-BR"/>
           </a:p>
@@ -2932,7 +2932,7 @@
           <a:p>
             <a:fld id="{ABE38136-2B41-4F4A-9088-83265D9E6BC0}" type="datetimeFigureOut">
               <a:rPr lang="pt-BR" smtClean="0"/>
-              <a:t>31/10/2023</a:t>
+              <a:t>06/11/2023</a:t>
             </a:fld>
             <a:endParaRPr lang="pt-BR"/>
           </a:p>
@@ -3899,7 +3899,7 @@
         </p:nvSpPr>
         <p:spPr>
           <a:xfrm>
-            <a:off x="3736848" y="179474"/>
+            <a:off x="1762526" y="179473"/>
             <a:ext cx="4718304" cy="584775"/>
           </a:xfrm>
           <a:prstGeom prst="rect">
@@ -4723,7 +4723,7 @@
         </p:nvSpPr>
         <p:spPr>
           <a:xfrm>
-            <a:off x="3736848" y="179474"/>
+            <a:off x="1764792" y="179473"/>
             <a:ext cx="4718304" cy="584775"/>
           </a:xfrm>
           <a:prstGeom prst="rect">

</xml_diff>